<commit_message>
more formulation slide updates
</commit_message>
<xml_diff>
--- a/03 - Data Exploration, Analytical Formulation, and Baselines/formulation-discussion.pptx
+++ b/03 - Data Exploration, Analytical Formulation, and Baselines/formulation-discussion.pptx
@@ -9137,7 +9137,15 @@
             <a:pPr lvl="1"/>
             <a:r>
               <a:rPr lang="en-US" dirty="0"/>
-              <a:t>Video + Reading for ML Pipelines (for Tuesday)</a:t>
+              <a:t>Review slides on </a:t>
+            </a:r>
+            <a:r>
+              <a:rPr lang="en-US" dirty="0" err="1"/>
+              <a:t>github</a:t>
+            </a:r>
+            <a:r>
+              <a:rPr lang="en-US" dirty="0"/>
+              <a:t> + Reading for ML Pipelines (for Tuesday)</a:t>
             </a:r>
             <a:br>
               <a:rPr lang="en-US" dirty="0"/>
@@ -9715,7 +9723,15 @@
             <a:pPr lvl="1"/>
             <a:r>
               <a:rPr lang="en-US" dirty="0"/>
-              <a:t>Video + Reading for ML Pipelines (for Tuesday)</a:t>
+              <a:t>Review slides on </a:t>
+            </a:r>
+            <a:r>
+              <a:rPr lang="en-US" dirty="0" err="1"/>
+              <a:t>github</a:t>
+            </a:r>
+            <a:r>
+              <a:rPr lang="en-US" dirty="0"/>
+              <a:t> + Reading for ML Pipelines (for Tuesday)</a:t>
             </a:r>
             <a:br>
               <a:rPr lang="en-US" dirty="0"/>

</xml_diff>